<commit_message>
titles in sample data documents
</commit_message>
<xml_diff>
--- a/exo-addons-demo-extension-webapp/src/main/webapp/WEB-INF/classes/medias/documents/May MTD 2013 Funnel report Week 21.pptx
+++ b/exo-addons-demo-extension-webapp/src/main/webapp/WEB-INF/classes/medias/documents/May MTD 2013 Funnel report Week 21.pptx
@@ -114,7 +114,7 @@
   </p:defaultTextStyle>
   <p:extLst>
     <p:ext uri="{EFAFB233-063F-42B5-8137-9DF3F51BA10A}">
-      <p15:sldGuideLst xmlns:p15="http://schemas.microsoft.com/office/powerpoint/2012/main" xmlns="">
+      <p15:sldGuideLst xmlns="" xmlns:p15="http://schemas.microsoft.com/office/powerpoint/2012/main">
         <p15:guide id="1" orient="horz" pos="2160">
           <p15:clr>
             <a:srgbClr val="A4A3A4"/>
@@ -128,7 +128,7 @@
       </p15:sldGuideLst>
     </p:ext>
     <p:ext uri="{2D200454-40CA-4A62-9FC3-DE9A4176ACB9}">
-      <p15:notesGuideLst xmlns:p15="http://schemas.microsoft.com/office/powerpoint/2012/main" xmlns="">
+      <p15:notesGuideLst xmlns="" xmlns:p15="http://schemas.microsoft.com/office/powerpoint/2012/main">
         <p15:guide id="1" orient="horz" pos="2880">
           <p15:clr>
             <a:srgbClr val="A4A3A4"/>
@@ -228,7 +228,7 @@
             <a:fld id="{7C1A5388-4CD7-1F42-A42E-EDA2E922225C}" type="datetimeFigureOut">
               <a:rPr lang="fr-FR"/>
               <a:pPr/>
-              <a:t>12/07/13</a:t>
+              <a:t>16/07/13</a:t>
             </a:fld>
             <a:endParaRPr lang="fr-FR"/>
           </a:p>
@@ -396,7 +396,7 @@
             <a:fld id="{E4DEF282-6933-5047-8C3D-32FE7E4F443D}" type="datetimeFigureOut">
               <a:rPr lang="en-US" smtClean="0"/>
               <a:pPr/>
-              <a:t>12/07/13</a:t>
+              <a:t>16/07/13</a:t>
             </a:fld>
             <a:endParaRPr lang="en-US"/>
           </a:p>
@@ -3713,7 +3713,7 @@
             <a:fld id="{E1A18984-52EE-47DA-9950-3C31068BE82B}" type="datetimeFigureOut">
               <a:rPr lang="fr-FR" smtClean="0"/>
               <a:pPr/>
-              <a:t>12/07/13</a:t>
+              <a:t>16/07/13</a:t>
             </a:fld>
             <a:endParaRPr lang="fr-FR"/>
           </a:p>
@@ -4977,7 +4977,7 @@
             <a:fld id="{E1A18984-52EE-47DA-9950-3C31068BE82B}" type="datetimeFigureOut">
               <a:rPr lang="fr-FR" smtClean="0"/>
               <a:pPr/>
-              <a:t>12/07/13</a:t>
+              <a:t>16/07/13</a:t>
             </a:fld>
             <a:endParaRPr lang="fr-FR"/>
           </a:p>

</xml_diff>